<commit_message>
Research on Handling Error
</commit_message>
<xml_diff>
--- a/Tìm hiểu về handle exception_To Tran Minh Nhut_Nguyen Quoc Huy.pptx
+++ b/Tìm hiểu về handle exception_To Tran Minh Nhut_Nguyen Quoc Huy.pptx
@@ -21,11 +21,14 @@
     <p:sldId id="276" r:id="rId15"/>
     <p:sldId id="277" r:id="rId16"/>
     <p:sldId id="278" r:id="rId17"/>
-    <p:sldId id="257" r:id="rId18"/>
-    <p:sldId id="269" r:id="rId19"/>
-    <p:sldId id="271" r:id="rId20"/>
-    <p:sldId id="259" r:id="rId21"/>
-    <p:sldId id="274" r:id="rId22"/>
+    <p:sldId id="279" r:id="rId18"/>
+    <p:sldId id="280" r:id="rId19"/>
+    <p:sldId id="257" r:id="rId20"/>
+    <p:sldId id="269" r:id="rId21"/>
+    <p:sldId id="271" r:id="rId22"/>
+    <p:sldId id="259" r:id="rId23"/>
+    <p:sldId id="274" r:id="rId24"/>
+    <p:sldId id="281" r:id="rId25"/>
   </p:sldIdLst>
   <p:sldSz cx="9144000" cy="6858000" type="screen4x3"/>
   <p:notesSz cx="6858000" cy="9144000"/>
@@ -126,7 +129,7 @@
   </p:defaultTextStyle>
   <p:extLst>
     <p:ext uri="{EFAFB233-063F-42B5-8137-9DF3F51BA10A}">
-      <p15:sldGuideLst xmlns:p15="http://schemas.microsoft.com/office/powerpoint/2012/main">
+      <p15:sldGuideLst xmlns:p15="http://schemas.microsoft.com/office/powerpoint/2012/main" xmlns="">
         <p15:guide id="1" orient="horz" pos="2160">
           <p15:clr>
             <a:srgbClr val="A4A3A4"/>
@@ -281,7 +284,7 @@
             <a:fld id="{1D8BD707-D9CF-40AE-B4C6-C98DA3205C09}" type="datetimeFigureOut">
               <a:rPr lang="en-US" smtClean="0"/>
               <a:pPr/>
-              <a:t>7/30/2016</a:t>
+              <a:t>8/1/2016</a:t>
             </a:fld>
             <a:endParaRPr lang="en-US"/>
           </a:p>
@@ -1152,7 +1155,7 @@
             <a:fld id="{1D8BD707-D9CF-40AE-B4C6-C98DA3205C09}" type="datetimeFigureOut">
               <a:rPr lang="en-US" smtClean="0"/>
               <a:pPr/>
-              <a:t>7/30/2016</a:t>
+              <a:t>8/1/2016</a:t>
             </a:fld>
             <a:endParaRPr lang="en-US"/>
           </a:p>
@@ -1329,7 +1332,7 @@
             <a:fld id="{1D8BD707-D9CF-40AE-B4C6-C98DA3205C09}" type="datetimeFigureOut">
               <a:rPr lang="en-US" smtClean="0"/>
               <a:pPr/>
-              <a:t>7/30/2016</a:t>
+              <a:t>8/1/2016</a:t>
             </a:fld>
             <a:endParaRPr lang="en-US"/>
           </a:p>
@@ -1501,7 +1504,7 @@
             <a:fld id="{1D8BD707-D9CF-40AE-B4C6-C98DA3205C09}" type="datetimeFigureOut">
               <a:rPr lang="en-US" smtClean="0"/>
               <a:pPr/>
-              <a:t>7/30/2016</a:t>
+              <a:t>8/1/2016</a:t>
             </a:fld>
             <a:endParaRPr lang="en-US"/>
           </a:p>
@@ -1713,7 +1716,7 @@
             <a:fld id="{1D8BD707-D9CF-40AE-B4C6-C98DA3205C09}" type="datetimeFigureOut">
               <a:rPr lang="en-US" smtClean="0"/>
               <a:pPr/>
-              <a:t>7/30/2016</a:t>
+              <a:t>8/1/2016</a:t>
             </a:fld>
             <a:endParaRPr lang="en-US"/>
           </a:p>
@@ -2529,7 +2532,7 @@
             <a:fld id="{1D8BD707-D9CF-40AE-B4C6-C98DA3205C09}" type="datetimeFigureOut">
               <a:rPr lang="en-US" smtClean="0"/>
               <a:pPr/>
-              <a:t>7/30/2016</a:t>
+              <a:t>8/1/2016</a:t>
             </a:fld>
             <a:endParaRPr lang="en-US"/>
           </a:p>
@@ -2767,7 +2770,7 @@
             <a:fld id="{1D8BD707-D9CF-40AE-B4C6-C98DA3205C09}" type="datetimeFigureOut">
               <a:rPr lang="en-US" smtClean="0"/>
               <a:pPr/>
-              <a:t>7/30/2016</a:t>
+              <a:t>8/1/2016</a:t>
             </a:fld>
             <a:endParaRPr lang="en-US"/>
           </a:p>
@@ -3092,7 +3095,7 @@
             <a:fld id="{1D8BD707-D9CF-40AE-B4C6-C98DA3205C09}" type="datetimeFigureOut">
               <a:rPr lang="en-US" smtClean="0"/>
               <a:pPr/>
-              <a:t>7/30/2016</a:t>
+              <a:t>8/1/2016</a:t>
             </a:fld>
             <a:endParaRPr lang="en-US"/>
           </a:p>
@@ -3184,7 +3187,7 @@
             <a:fld id="{1D8BD707-D9CF-40AE-B4C6-C98DA3205C09}" type="datetimeFigureOut">
               <a:rPr lang="en-US" smtClean="0"/>
               <a:pPr/>
-              <a:t>7/30/2016</a:t>
+              <a:t>8/1/2016</a:t>
             </a:fld>
             <a:endParaRPr lang="en-US"/>
           </a:p>
@@ -3703,7 +3706,7 @@
             <a:fld id="{1D8BD707-D9CF-40AE-B4C6-C98DA3205C09}" type="datetimeFigureOut">
               <a:rPr lang="en-US" smtClean="0"/>
               <a:pPr/>
-              <a:t>7/30/2016</a:t>
+              <a:t>8/1/2016</a:t>
             </a:fld>
             <a:endParaRPr lang="en-US"/>
           </a:p>
@@ -4216,7 +4219,7 @@
             <a:fld id="{1D8BD707-D9CF-40AE-B4C6-C98DA3205C09}" type="datetimeFigureOut">
               <a:rPr lang="en-US" smtClean="0"/>
               <a:pPr/>
-              <a:t>7/30/2016</a:t>
+              <a:t>8/1/2016</a:t>
             </a:fld>
             <a:endParaRPr lang="en-US"/>
           </a:p>
@@ -4463,7 +4466,7 @@
             <a:fld id="{1D8BD707-D9CF-40AE-B4C6-C98DA3205C09}" type="datetimeFigureOut">
               <a:rPr lang="en-US" smtClean="0"/>
               <a:pPr/>
-              <a:t>7/30/2016</a:t>
+              <a:t>8/1/2016</a:t>
             </a:fld>
             <a:endParaRPr lang="en-US"/>
           </a:p>
@@ -7025,6 +7028,434 @@
           <a:lstStyle/>
           <a:p>
             <a:r>
+              <a:rPr lang="en-US" dirty="0" smtClean="0"/>
+              <a:t>Exception </a:t>
+            </a:r>
+            <a:r>
+              <a:rPr lang="en-US" dirty="0" err="1" smtClean="0"/>
+              <a:t>trong</a:t>
+            </a:r>
+            <a:r>
+              <a:rPr lang="en-US" dirty="0" smtClean="0"/>
+              <a:t> overloading</a:t>
+            </a:r>
+            <a:endParaRPr lang="en-US" dirty="0"/>
+          </a:p>
+        </p:txBody>
+      </p:sp>
+      <p:sp>
+        <p:nvSpPr>
+          <p:cNvPr id="3" name="Content Placeholder 2"/>
+          <p:cNvSpPr>
+            <a:spLocks noGrp="1"/>
+          </p:cNvSpPr>
+          <p:nvPr>
+            <p:ph sz="quarter" idx="1"/>
+          </p:nvPr>
+        </p:nvSpPr>
+        <p:spPr/>
+        <p:txBody>
+          <a:bodyPr>
+            <a:normAutofit/>
+          </a:bodyPr>
+          <a:lstStyle/>
+          <a:p>
+            <a:r>
+              <a:rPr lang="en-US" dirty="0" err="1" smtClean="0"/>
+              <a:t>Khi</a:t>
+            </a:r>
+            <a:r>
+              <a:rPr lang="en-US" dirty="0"/>
+              <a:t> </a:t>
+            </a:r>
+            <a:r>
+              <a:rPr lang="en-US" dirty="0" err="1" smtClean="0"/>
+              <a:t>một</a:t>
+            </a:r>
+            <a:r>
+              <a:rPr lang="en-US" dirty="0" smtClean="0"/>
+              <a:t> </a:t>
+            </a:r>
+            <a:r>
+              <a:rPr lang="en-US" dirty="0" err="1" smtClean="0"/>
+              <a:t>phương</a:t>
+            </a:r>
+            <a:r>
+              <a:rPr lang="en-US" dirty="0" smtClean="0"/>
+              <a:t> </a:t>
+            </a:r>
+            <a:r>
+              <a:rPr lang="en-US" dirty="0" err="1" smtClean="0"/>
+              <a:t>thức</a:t>
+            </a:r>
+            <a:r>
+              <a:rPr lang="en-US" dirty="0" smtClean="0"/>
+              <a:t> </a:t>
+            </a:r>
+            <a:r>
+              <a:rPr lang="en-US" dirty="0" err="1" smtClean="0"/>
+              <a:t>được</a:t>
+            </a:r>
+            <a:r>
+              <a:rPr lang="en-US" dirty="0" smtClean="0"/>
+              <a:t> </a:t>
+            </a:r>
+            <a:r>
+              <a:rPr lang="en-US" dirty="0" err="1" smtClean="0"/>
+              <a:t>xử</a:t>
+            </a:r>
+            <a:r>
+              <a:rPr lang="en-US" dirty="0" smtClean="0"/>
+              <a:t> </a:t>
+            </a:r>
+            <a:r>
+              <a:rPr lang="en-US" dirty="0" err="1" smtClean="0"/>
+              <a:t>lý</a:t>
+            </a:r>
+            <a:r>
+              <a:rPr lang="en-US" dirty="0" smtClean="0"/>
+              <a:t> exception, </a:t>
+            </a:r>
+            <a:r>
+              <a:rPr lang="en-US" dirty="0" err="1" smtClean="0"/>
+              <a:t>và</a:t>
+            </a:r>
+            <a:r>
+              <a:rPr lang="en-US" dirty="0" smtClean="0"/>
+              <a:t> </a:t>
+            </a:r>
+            <a:r>
+              <a:rPr lang="en-US" dirty="0" err="1" smtClean="0"/>
+              <a:t>nó</a:t>
+            </a:r>
+            <a:r>
+              <a:rPr lang="en-US" dirty="0" smtClean="0"/>
+              <a:t> </a:t>
+            </a:r>
+            <a:r>
+              <a:rPr lang="en-US" dirty="0" err="1" smtClean="0"/>
+              <a:t>được</a:t>
+            </a:r>
+            <a:r>
+              <a:rPr lang="en-US" dirty="0" smtClean="0"/>
+              <a:t> overloading, </a:t>
+            </a:r>
+            <a:r>
+              <a:rPr lang="en-US" dirty="0" err="1" smtClean="0"/>
+              <a:t>thì</a:t>
+            </a:r>
+            <a:r>
+              <a:rPr lang="en-US" dirty="0" smtClean="0"/>
+              <a:t> </a:t>
+            </a:r>
+            <a:r>
+              <a:rPr lang="en-US" dirty="0" err="1" smtClean="0"/>
+              <a:t>độ</a:t>
+            </a:r>
+            <a:r>
+              <a:rPr lang="en-US" dirty="0" smtClean="0"/>
+              <a:t> </a:t>
+            </a:r>
+            <a:r>
+              <a:rPr lang="en-US" dirty="0" err="1" smtClean="0"/>
+              <a:t>ưu</a:t>
+            </a:r>
+            <a:r>
+              <a:rPr lang="en-US" dirty="0" smtClean="0"/>
+              <a:t> </a:t>
+            </a:r>
+            <a:r>
+              <a:rPr lang="en-US" dirty="0" err="1" smtClean="0"/>
+              <a:t>tiên</a:t>
+            </a:r>
+            <a:r>
+              <a:rPr lang="en-US" dirty="0" smtClean="0"/>
+              <a:t> </a:t>
+            </a:r>
+            <a:r>
+              <a:rPr lang="en-US" dirty="0" err="1" smtClean="0"/>
+              <a:t>của</a:t>
+            </a:r>
+            <a:r>
+              <a:rPr lang="en-US" dirty="0" smtClean="0"/>
+              <a:t> overloading </a:t>
+            </a:r>
+            <a:r>
+              <a:rPr lang="en-US" dirty="0" err="1" smtClean="0"/>
+              <a:t>cao</a:t>
+            </a:r>
+            <a:r>
+              <a:rPr lang="en-US" dirty="0" smtClean="0"/>
+              <a:t> </a:t>
+            </a:r>
+            <a:r>
+              <a:rPr lang="en-US" dirty="0" err="1" smtClean="0"/>
+              <a:t>hơn</a:t>
+            </a:r>
+            <a:r>
+              <a:rPr lang="en-US" dirty="0" smtClean="0"/>
+              <a:t> exception.</a:t>
+            </a:r>
+            <a:endParaRPr lang="en-US" dirty="0"/>
+          </a:p>
+          <a:p>
+            <a:r>
+              <a:rPr lang="en-US" dirty="0" err="1" smtClean="0"/>
+              <a:t>Ví</a:t>
+            </a:r>
+            <a:r>
+              <a:rPr lang="en-US" dirty="0" smtClean="0"/>
+              <a:t> </a:t>
+            </a:r>
+            <a:r>
+              <a:rPr lang="en-US" dirty="0" err="1" smtClean="0"/>
+              <a:t>dụ</a:t>
+            </a:r>
+            <a:r>
+              <a:rPr lang="en-US" dirty="0" smtClean="0"/>
+              <a:t> minh </a:t>
+            </a:r>
+            <a:r>
+              <a:rPr lang="en-US" dirty="0" err="1" smtClean="0"/>
+              <a:t>họa</a:t>
+            </a:r>
+            <a:r>
+              <a:rPr lang="en-US" dirty="0" smtClean="0"/>
+              <a:t>:</a:t>
+            </a:r>
+          </a:p>
+        </p:txBody>
+      </p:sp>
+    </p:spTree>
+    <p:extLst>
+      <p:ext uri="{BB962C8B-B14F-4D97-AF65-F5344CB8AC3E}">
+        <p14:creationId xmlns:p14="http://schemas.microsoft.com/office/powerpoint/2010/main" val="4010918051"/>
+      </p:ext>
+    </p:extLst>
+  </p:cSld>
+  <p:clrMapOvr>
+    <a:masterClrMapping/>
+  </p:clrMapOvr>
+</p:sld>
+</file>
+
+<file path=ppt/slides/slide18.xml><?xml version="1.0" encoding="utf-8"?>
+<p:sld xmlns:a="http://schemas.openxmlformats.org/drawingml/2006/main" xmlns:r="http://schemas.openxmlformats.org/officeDocument/2006/relationships" xmlns:p="http://schemas.openxmlformats.org/presentationml/2006/main">
+  <p:cSld>
+    <p:spTree>
+      <p:nvGrpSpPr>
+        <p:cNvPr id="1" name=""/>
+        <p:cNvGrpSpPr/>
+        <p:nvPr/>
+      </p:nvGrpSpPr>
+      <p:grpSpPr>
+        <a:xfrm>
+          <a:off x="0" y="0"/>
+          <a:ext cx="0" cy="0"/>
+          <a:chOff x="0" y="0"/>
+          <a:chExt cx="0" cy="0"/>
+        </a:xfrm>
+      </p:grpSpPr>
+      <p:sp>
+        <p:nvSpPr>
+          <p:cNvPr id="2" name="Title 1"/>
+          <p:cNvSpPr>
+            <a:spLocks noGrp="1"/>
+          </p:cNvSpPr>
+          <p:nvPr>
+            <p:ph type="title"/>
+          </p:nvPr>
+        </p:nvSpPr>
+        <p:spPr/>
+        <p:txBody>
+          <a:bodyPr/>
+          <a:lstStyle/>
+          <a:p>
+            <a:r>
+              <a:rPr lang="en-US" dirty="0"/>
+              <a:t>Exception </a:t>
+            </a:r>
+            <a:r>
+              <a:rPr lang="en-US" dirty="0" err="1"/>
+              <a:t>trong</a:t>
+            </a:r>
+            <a:r>
+              <a:rPr lang="en-US" dirty="0"/>
+              <a:t> overloading</a:t>
+            </a:r>
+          </a:p>
+        </p:txBody>
+      </p:sp>
+      <p:sp>
+        <p:nvSpPr>
+          <p:cNvPr id="3" name="Content Placeholder 2"/>
+          <p:cNvSpPr>
+            <a:spLocks noGrp="1"/>
+          </p:cNvSpPr>
+          <p:nvPr>
+            <p:ph sz="quarter" idx="1"/>
+          </p:nvPr>
+        </p:nvSpPr>
+        <p:spPr/>
+        <p:txBody>
+          <a:bodyPr/>
+          <a:lstStyle/>
+          <a:p>
+            <a:endParaRPr lang="en-US" dirty="0" smtClean="0"/>
+          </a:p>
+          <a:p>
+            <a:endParaRPr lang="en-US" dirty="0"/>
+          </a:p>
+          <a:p>
+            <a:endParaRPr lang="en-US" dirty="0" smtClean="0"/>
+          </a:p>
+          <a:p>
+            <a:endParaRPr lang="en-US" dirty="0"/>
+          </a:p>
+          <a:p>
+            <a:endParaRPr lang="en-US" dirty="0" smtClean="0"/>
+          </a:p>
+          <a:p>
+            <a:endParaRPr lang="en-US" dirty="0"/>
+          </a:p>
+          <a:p>
+            <a:endParaRPr lang="en-US" dirty="0" smtClean="0"/>
+          </a:p>
+          <a:p>
+            <a:endParaRPr lang="en-US" dirty="0" smtClean="0"/>
+          </a:p>
+          <a:p>
+            <a:r>
+              <a:rPr lang="en-US" sz="1800" dirty="0" err="1" smtClean="0"/>
+              <a:t>Kết</a:t>
+            </a:r>
+            <a:r>
+              <a:rPr lang="en-US" sz="1800" dirty="0" smtClean="0"/>
+              <a:t> </a:t>
+            </a:r>
+            <a:r>
+              <a:rPr lang="en-US" sz="1800" dirty="0" err="1" smtClean="0"/>
+              <a:t>quả</a:t>
+            </a:r>
+            <a:endParaRPr lang="en-US" sz="1800" dirty="0" smtClean="0"/>
+          </a:p>
+          <a:p>
+            <a:endParaRPr lang="en-US" dirty="0"/>
+          </a:p>
+          <a:p>
+            <a:endParaRPr lang="en-US" dirty="0" smtClean="0"/>
+          </a:p>
+          <a:p>
+            <a:endParaRPr lang="en-US" dirty="0"/>
+          </a:p>
+        </p:txBody>
+      </p:sp>
+      <p:pic>
+        <p:nvPicPr>
+          <p:cNvPr id="6" name="Picture 5"/>
+          <p:cNvPicPr>
+            <a:picLocks noChangeAspect="1"/>
+          </p:cNvPicPr>
+          <p:nvPr/>
+        </p:nvPicPr>
+        <p:blipFill>
+          <a:blip r:embed="rId2">
+            <a:extLst>
+              <a:ext uri="{28A0092B-C50C-407E-A947-70E740481C1C}">
+                <a14:useLocalDpi xmlns:a14="http://schemas.microsoft.com/office/drawing/2010/main" val="0"/>
+              </a:ext>
+            </a:extLst>
+          </a:blip>
+          <a:stretch>
+            <a:fillRect/>
+          </a:stretch>
+        </p:blipFill>
+        <p:spPr>
+          <a:xfrm>
+            <a:off x="787893" y="1676399"/>
+            <a:ext cx="4047619" cy="3428261"/>
+          </a:xfrm>
+          <a:prstGeom prst="rect">
+            <a:avLst/>
+          </a:prstGeom>
+        </p:spPr>
+      </p:pic>
+      <p:pic>
+        <p:nvPicPr>
+          <p:cNvPr id="7" name="Picture 6"/>
+          <p:cNvPicPr>
+            <a:picLocks noChangeAspect="1"/>
+          </p:cNvPicPr>
+          <p:nvPr/>
+        </p:nvPicPr>
+        <p:blipFill>
+          <a:blip r:embed="rId3">
+            <a:extLst>
+              <a:ext uri="{28A0092B-C50C-407E-A947-70E740481C1C}">
+                <a14:useLocalDpi xmlns:a14="http://schemas.microsoft.com/office/drawing/2010/main" val="0"/>
+              </a:ext>
+            </a:extLst>
+          </a:blip>
+          <a:stretch>
+            <a:fillRect/>
+          </a:stretch>
+        </p:blipFill>
+        <p:spPr>
+          <a:xfrm>
+            <a:off x="838200" y="5615126"/>
+            <a:ext cx="4866667" cy="819048"/>
+          </a:xfrm>
+          <a:prstGeom prst="rect">
+            <a:avLst/>
+          </a:prstGeom>
+        </p:spPr>
+      </p:pic>
+    </p:spTree>
+    <p:extLst>
+      <p:ext uri="{BB962C8B-B14F-4D97-AF65-F5344CB8AC3E}">
+        <p14:creationId xmlns:p14="http://schemas.microsoft.com/office/powerpoint/2010/main" val="3007376135"/>
+      </p:ext>
+    </p:extLst>
+  </p:cSld>
+  <p:clrMapOvr>
+    <a:masterClrMapping/>
+  </p:clrMapOvr>
+</p:sld>
+</file>
+
+<file path=ppt/slides/slide19.xml><?xml version="1.0" encoding="utf-8"?>
+<p:sld xmlns:a="http://schemas.openxmlformats.org/drawingml/2006/main" xmlns:r="http://schemas.openxmlformats.org/officeDocument/2006/relationships" xmlns:p="http://schemas.openxmlformats.org/presentationml/2006/main">
+  <p:cSld>
+    <p:spTree>
+      <p:nvGrpSpPr>
+        <p:cNvPr id="1" name=""/>
+        <p:cNvGrpSpPr/>
+        <p:nvPr/>
+      </p:nvGrpSpPr>
+      <p:grpSpPr>
+        <a:xfrm>
+          <a:off x="0" y="0"/>
+          <a:ext cx="0" cy="0"/>
+          <a:chOff x="0" y="0"/>
+          <a:chExt cx="0" cy="0"/>
+        </a:xfrm>
+      </p:grpSpPr>
+      <p:sp>
+        <p:nvSpPr>
+          <p:cNvPr id="2" name="Title 1"/>
+          <p:cNvSpPr>
+            <a:spLocks noGrp="1"/>
+          </p:cNvSpPr>
+          <p:nvPr>
+            <p:ph type="title"/>
+          </p:nvPr>
+        </p:nvSpPr>
+        <p:spPr/>
+        <p:txBody>
+          <a:bodyPr/>
+          <a:lstStyle/>
+          <a:p>
+            <a:r>
               <a:rPr lang="en-US" dirty="0" err="1" smtClean="0"/>
               <a:t>Thông</a:t>
             </a:r>
@@ -7161,900 +7592,6 @@
     <p:extLst>
       <p:ext uri="{BB962C8B-B14F-4D97-AF65-F5344CB8AC3E}">
         <p14:creationId xmlns:p14="http://schemas.microsoft.com/office/powerpoint/2010/main" val="3627023008"/>
-      </p:ext>
-    </p:extLst>
-  </p:cSld>
-  <p:clrMapOvr>
-    <a:masterClrMapping/>
-  </p:clrMapOvr>
-</p:sld>
-</file>
-
-<file path=ppt/slides/slide18.xml><?xml version="1.0" encoding="utf-8"?>
-<p:sld xmlns:a="http://schemas.openxmlformats.org/drawingml/2006/main" xmlns:r="http://schemas.openxmlformats.org/officeDocument/2006/relationships" xmlns:p="http://schemas.openxmlformats.org/presentationml/2006/main">
-  <p:cSld>
-    <p:spTree>
-      <p:nvGrpSpPr>
-        <p:cNvPr id="1" name=""/>
-        <p:cNvGrpSpPr/>
-        <p:nvPr/>
-      </p:nvGrpSpPr>
-      <p:grpSpPr>
-        <a:xfrm>
-          <a:off x="0" y="0"/>
-          <a:ext cx="0" cy="0"/>
-          <a:chOff x="0" y="0"/>
-          <a:chExt cx="0" cy="0"/>
-        </a:xfrm>
-      </p:grpSpPr>
-      <p:pic>
-        <p:nvPicPr>
-          <p:cNvPr id="7" name="Picture 6" descr="Screen Clipping"/>
-          <p:cNvPicPr>
-            <a:picLocks noChangeAspect="1"/>
-          </p:cNvPicPr>
-          <p:nvPr/>
-        </p:nvPicPr>
-        <p:blipFill>
-          <a:blip r:embed="rId2">
-            <a:extLst>
-              <a:ext uri="{28A0092B-C50C-407E-A947-70E740481C1C}">
-                <a14:useLocalDpi xmlns:a14="http://schemas.microsoft.com/office/drawing/2010/main" val="0"/>
-              </a:ext>
-            </a:extLst>
-          </a:blip>
-          <a:stretch>
-            <a:fillRect/>
-          </a:stretch>
-        </p:blipFill>
-        <p:spPr>
-          <a:xfrm>
-            <a:off x="266684" y="3054927"/>
-            <a:ext cx="6382641" cy="3448532"/>
-          </a:xfrm>
-          <a:prstGeom prst="rect">
-            <a:avLst/>
-          </a:prstGeom>
-        </p:spPr>
-      </p:pic>
-      <p:sp>
-        <p:nvSpPr>
-          <p:cNvPr id="2" name="Title 1"/>
-          <p:cNvSpPr>
-            <a:spLocks noGrp="1"/>
-          </p:cNvSpPr>
-          <p:nvPr>
-            <p:ph type="title"/>
-          </p:nvPr>
-        </p:nvSpPr>
-        <p:spPr/>
-        <p:txBody>
-          <a:bodyPr/>
-          <a:lstStyle/>
-          <a:p>
-            <a:r>
-              <a:rPr lang="en-US" dirty="0" err="1" smtClean="0"/>
-              <a:t>Thông</a:t>
-            </a:r>
-            <a:r>
-              <a:rPr lang="en-US" dirty="0" smtClean="0"/>
-              <a:t> tin </a:t>
-            </a:r>
-            <a:r>
-              <a:rPr lang="en-US" dirty="0" err="1" smtClean="0"/>
-              <a:t>thêm</a:t>
-            </a:r>
-            <a:endParaRPr lang="en-US" dirty="0"/>
-          </a:p>
-        </p:txBody>
-      </p:sp>
-      <p:sp>
-        <p:nvSpPr>
-          <p:cNvPr id="3" name="Content Placeholder 2"/>
-          <p:cNvSpPr>
-            <a:spLocks noGrp="1"/>
-          </p:cNvSpPr>
-          <p:nvPr>
-            <p:ph sz="quarter" idx="1"/>
-          </p:nvPr>
-        </p:nvSpPr>
-        <p:spPr/>
-        <p:txBody>
-          <a:bodyPr>
-            <a:normAutofit/>
-          </a:bodyPr>
-          <a:lstStyle/>
-          <a:p>
-            <a:pPr marL="0" indent="0">
-              <a:buNone/>
-            </a:pPr>
-            <a:r>
-              <a:rPr lang="en-US" sz="2400" dirty="0" smtClean="0"/>
-              <a:t>Ta </a:t>
-            </a:r>
-            <a:r>
-              <a:rPr lang="en-US" sz="2400" dirty="0" err="1" smtClean="0"/>
-              <a:t>cũng</a:t>
-            </a:r>
-            <a:r>
-              <a:rPr lang="en-US" sz="2400" dirty="0" smtClean="0"/>
-              <a:t> </a:t>
-            </a:r>
-            <a:r>
-              <a:rPr lang="en-US" sz="2400" dirty="0" err="1" smtClean="0"/>
-              <a:t>có</a:t>
-            </a:r>
-            <a:r>
-              <a:rPr lang="en-US" sz="2400" dirty="0" smtClean="0"/>
-              <a:t> </a:t>
-            </a:r>
-            <a:r>
-              <a:rPr lang="en-US" sz="2400" dirty="0" err="1" smtClean="0"/>
-              <a:t>thể</a:t>
-            </a:r>
-            <a:r>
-              <a:rPr lang="en-US" sz="2400" dirty="0" smtClean="0"/>
-              <a:t> </a:t>
-            </a:r>
-            <a:r>
-              <a:rPr lang="en-US" sz="2400" dirty="0" err="1" smtClean="0"/>
-              <a:t>tạo</a:t>
-            </a:r>
-            <a:r>
-              <a:rPr lang="en-US" sz="2400" dirty="0" smtClean="0"/>
-              <a:t> </a:t>
-            </a:r>
-            <a:r>
-              <a:rPr lang="en-US" sz="2400" dirty="0" err="1" smtClean="0"/>
-              <a:t>biến</a:t>
-            </a:r>
-            <a:r>
-              <a:rPr lang="en-US" sz="2400" dirty="0" smtClean="0"/>
-              <a:t> </a:t>
-            </a:r>
-            <a:r>
-              <a:rPr lang="en-US" sz="2400" dirty="0" err="1" smtClean="0"/>
-              <a:t>và</a:t>
-            </a:r>
-            <a:r>
-              <a:rPr lang="en-US" sz="2400" dirty="0" smtClean="0"/>
-              <a:t> </a:t>
-            </a:r>
-            <a:r>
-              <a:rPr lang="en-US" sz="2400" dirty="0" err="1" smtClean="0"/>
-              <a:t>xử</a:t>
-            </a:r>
-            <a:r>
-              <a:rPr lang="en-US" sz="2400" dirty="0" smtClean="0"/>
-              <a:t> </a:t>
-            </a:r>
-            <a:r>
-              <a:rPr lang="en-US" sz="2400" dirty="0" err="1" smtClean="0"/>
-              <a:t>lý</a:t>
-            </a:r>
-            <a:r>
-              <a:rPr lang="en-US" sz="2400" dirty="0" smtClean="0"/>
-              <a:t> </a:t>
-            </a:r>
-            <a:r>
-              <a:rPr lang="en-US" sz="2400" dirty="0" err="1" smtClean="0"/>
-              <a:t>biến</a:t>
-            </a:r>
-            <a:r>
-              <a:rPr lang="en-US" sz="2400" dirty="0" smtClean="0"/>
-              <a:t> </a:t>
-            </a:r>
-            <a:r>
-              <a:rPr lang="en-US" sz="2400" dirty="0" err="1" smtClean="0"/>
-              <a:t>trong</a:t>
-            </a:r>
-            <a:r>
-              <a:rPr lang="en-US" sz="2400" dirty="0" smtClean="0"/>
-              <a:t> </a:t>
-            </a:r>
-            <a:r>
-              <a:rPr lang="en-US" sz="2400" dirty="0" err="1" smtClean="0"/>
-              <a:t>khối</a:t>
-            </a:r>
-            <a:r>
-              <a:rPr lang="en-US" sz="2400" dirty="0" smtClean="0"/>
-              <a:t> </a:t>
-            </a:r>
-            <a:r>
-              <a:rPr lang="en-US" sz="2400" dirty="0" err="1" smtClean="0"/>
-              <a:t>lệnh</a:t>
-            </a:r>
-            <a:r>
-              <a:rPr lang="en-US" sz="2400" dirty="0" smtClean="0"/>
-              <a:t> catch… </a:t>
-            </a:r>
-          </a:p>
-          <a:p>
-            <a:pPr marL="0" indent="0">
-              <a:buNone/>
-            </a:pPr>
-            <a:r>
-              <a:rPr lang="en-US" sz="2400" dirty="0" err="1" smtClean="0"/>
-              <a:t>Các</a:t>
-            </a:r>
-            <a:r>
-              <a:rPr lang="en-US" sz="2400" dirty="0" smtClean="0"/>
-              <a:t> </a:t>
-            </a:r>
-            <a:r>
-              <a:rPr lang="en-US" sz="2400" dirty="0" err="1" smtClean="0"/>
-              <a:t>biến</a:t>
-            </a:r>
-            <a:r>
-              <a:rPr lang="en-US" sz="2400" dirty="0" smtClean="0"/>
-              <a:t> </a:t>
-            </a:r>
-            <a:r>
-              <a:rPr lang="en-US" sz="2400" dirty="0" err="1" smtClean="0"/>
-              <a:t>trong</a:t>
-            </a:r>
-            <a:r>
-              <a:rPr lang="en-US" sz="2400" dirty="0" smtClean="0"/>
-              <a:t> </a:t>
-            </a:r>
-            <a:r>
-              <a:rPr lang="en-US" sz="2400" dirty="0" err="1" smtClean="0"/>
-              <a:t>khối</a:t>
-            </a:r>
-            <a:r>
-              <a:rPr lang="en-US" sz="2400" dirty="0" smtClean="0"/>
-              <a:t> </a:t>
-            </a:r>
-            <a:r>
-              <a:rPr lang="en-US" sz="2400" dirty="0" err="1" smtClean="0"/>
-              <a:t>lệnh</a:t>
-            </a:r>
-            <a:r>
-              <a:rPr lang="en-US" sz="2400" dirty="0" smtClean="0"/>
-              <a:t> catch… </a:t>
-            </a:r>
-            <a:r>
-              <a:rPr lang="en-US" sz="2400" dirty="0" err="1" smtClean="0"/>
-              <a:t>được</a:t>
-            </a:r>
-            <a:r>
-              <a:rPr lang="en-US" sz="2400" dirty="0" smtClean="0"/>
-              <a:t> </a:t>
-            </a:r>
-            <a:r>
-              <a:rPr lang="en-US" sz="2400" dirty="0" err="1" smtClean="0"/>
-              <a:t>thực</a:t>
-            </a:r>
-            <a:r>
-              <a:rPr lang="en-US" sz="2400" dirty="0" smtClean="0"/>
-              <a:t> </a:t>
-            </a:r>
-            <a:r>
-              <a:rPr lang="en-US" sz="2400" dirty="0" err="1" smtClean="0"/>
-              <a:t>thi</a:t>
-            </a:r>
-            <a:r>
-              <a:rPr lang="en-US" sz="2400" dirty="0" smtClean="0"/>
-              <a:t> </a:t>
-            </a:r>
-            <a:r>
-              <a:rPr lang="en-US" sz="2400" dirty="0" err="1" smtClean="0"/>
-              <a:t>khi</a:t>
-            </a:r>
-            <a:r>
-              <a:rPr lang="en-US" sz="2400" dirty="0" smtClean="0"/>
-              <a:t> </a:t>
-            </a:r>
-            <a:r>
-              <a:rPr lang="en-US" sz="2400" dirty="0" err="1" smtClean="0"/>
-              <a:t>có</a:t>
-            </a:r>
-            <a:r>
-              <a:rPr lang="en-US" sz="2400" dirty="0" smtClean="0"/>
-              <a:t> </a:t>
-            </a:r>
-            <a:r>
-              <a:rPr lang="en-US" sz="2400" dirty="0" err="1" smtClean="0"/>
-              <a:t>ngoại</a:t>
-            </a:r>
-            <a:r>
-              <a:rPr lang="en-US" sz="2400" dirty="0" smtClean="0"/>
-              <a:t> </a:t>
-            </a:r>
-            <a:r>
-              <a:rPr lang="en-US" sz="2400" dirty="0" err="1" smtClean="0"/>
-              <a:t>lệ</a:t>
-            </a:r>
-            <a:r>
-              <a:rPr lang="en-US" sz="2400" dirty="0" smtClean="0"/>
-              <a:t> </a:t>
-            </a:r>
-            <a:r>
-              <a:rPr lang="en-US" sz="2400" dirty="0" err="1" smtClean="0"/>
-              <a:t>xảy</a:t>
-            </a:r>
-            <a:r>
-              <a:rPr lang="en-US" sz="2400" dirty="0" smtClean="0"/>
-              <a:t> </a:t>
-            </a:r>
-            <a:r>
-              <a:rPr lang="en-US" sz="2400" dirty="0" err="1" smtClean="0"/>
-              <a:t>ra</a:t>
-            </a:r>
-            <a:r>
-              <a:rPr lang="en-US" sz="2400" dirty="0" smtClean="0"/>
-              <a:t>, </a:t>
-            </a:r>
-            <a:r>
-              <a:rPr lang="en-US" sz="2400" dirty="0" err="1" smtClean="0"/>
-              <a:t>tương</a:t>
-            </a:r>
-            <a:r>
-              <a:rPr lang="en-US" sz="2400" dirty="0" smtClean="0"/>
-              <a:t> </a:t>
-            </a:r>
-            <a:r>
-              <a:rPr lang="en-US" sz="2400" dirty="0" err="1" smtClean="0"/>
-              <a:t>tự</a:t>
-            </a:r>
-            <a:r>
-              <a:rPr lang="en-US" sz="2400" dirty="0" smtClean="0"/>
-              <a:t> </a:t>
-            </a:r>
-            <a:r>
-              <a:rPr lang="en-US" sz="2400" dirty="0" err="1" smtClean="0"/>
-              <a:t>như</a:t>
-            </a:r>
-            <a:r>
-              <a:rPr lang="en-US" sz="2400" dirty="0" smtClean="0"/>
-              <a:t> if…else</a:t>
-            </a:r>
-          </a:p>
-        </p:txBody>
-      </p:sp>
-      <p:pic>
-        <p:nvPicPr>
-          <p:cNvPr id="5" name="Picture 4" descr="Screen Clipping"/>
-          <p:cNvPicPr>
-            <a:picLocks noChangeAspect="1"/>
-          </p:cNvPicPr>
-          <p:nvPr/>
-        </p:nvPicPr>
-        <p:blipFill>
-          <a:blip r:embed="rId3">
-            <a:extLst>
-              <a:ext uri="{28A0092B-C50C-407E-A947-70E740481C1C}">
-                <a14:useLocalDpi xmlns:a14="http://schemas.microsoft.com/office/drawing/2010/main" val="0"/>
-              </a:ext>
-            </a:extLst>
-          </a:blip>
-          <a:stretch>
-            <a:fillRect/>
-          </a:stretch>
-        </p:blipFill>
-        <p:spPr>
-          <a:xfrm>
-            <a:off x="7049655" y="5181600"/>
-            <a:ext cx="2057400" cy="925830"/>
-          </a:xfrm>
-          <a:prstGeom prst="rect">
-            <a:avLst/>
-          </a:prstGeom>
-        </p:spPr>
-      </p:pic>
-      <p:sp>
-        <p:nvSpPr>
-          <p:cNvPr id="6" name="TextBox 5"/>
-          <p:cNvSpPr txBox="1"/>
-          <p:nvPr/>
-        </p:nvSpPr>
-        <p:spPr>
-          <a:xfrm>
-            <a:off x="6858000" y="4242706"/>
-            <a:ext cx="2125325" cy="369332"/>
-          </a:xfrm>
-          <a:prstGeom prst="rect">
-            <a:avLst/>
-          </a:prstGeom>
-          <a:noFill/>
-        </p:spPr>
-        <p:txBody>
-          <a:bodyPr wrap="none" rtlCol="0">
-            <a:spAutoFit/>
-          </a:bodyPr>
-          <a:lstStyle/>
-          <a:p>
-            <a:r>
-              <a:rPr lang="en-US" dirty="0" err="1" smtClean="0"/>
-              <a:t>Kết</a:t>
-            </a:r>
-            <a:r>
-              <a:rPr lang="en-US" dirty="0" smtClean="0"/>
-              <a:t> </a:t>
-            </a:r>
-            <a:r>
-              <a:rPr lang="en-US" dirty="0" err="1" smtClean="0"/>
-              <a:t>quả</a:t>
-            </a:r>
-            <a:r>
-              <a:rPr lang="en-US" dirty="0" smtClean="0"/>
-              <a:t> </a:t>
-            </a:r>
-            <a:r>
-              <a:rPr lang="en-US" dirty="0" err="1" smtClean="0"/>
-              <a:t>bình</a:t>
-            </a:r>
-            <a:r>
-              <a:rPr lang="en-US" dirty="0" smtClean="0"/>
-              <a:t> </a:t>
-            </a:r>
-            <a:r>
-              <a:rPr lang="en-US" dirty="0" err="1" smtClean="0"/>
-              <a:t>thường</a:t>
-            </a:r>
-            <a:endParaRPr lang="en-US" dirty="0"/>
-          </a:p>
-        </p:txBody>
-      </p:sp>
-    </p:spTree>
-    <p:extLst>
-      <p:ext uri="{BB962C8B-B14F-4D97-AF65-F5344CB8AC3E}">
-        <p14:creationId xmlns:p14="http://schemas.microsoft.com/office/powerpoint/2010/main" val="235308845"/>
-      </p:ext>
-    </p:extLst>
-  </p:cSld>
-  <p:clrMapOvr>
-    <a:masterClrMapping/>
-  </p:clrMapOvr>
-</p:sld>
-</file>
-
-<file path=ppt/slides/slide19.xml><?xml version="1.0" encoding="utf-8"?>
-<p:sld xmlns:a="http://schemas.openxmlformats.org/drawingml/2006/main" xmlns:r="http://schemas.openxmlformats.org/officeDocument/2006/relationships" xmlns:p="http://schemas.openxmlformats.org/presentationml/2006/main">
-  <p:cSld>
-    <p:spTree>
-      <p:nvGrpSpPr>
-        <p:cNvPr id="1" name=""/>
-        <p:cNvGrpSpPr/>
-        <p:nvPr/>
-      </p:nvGrpSpPr>
-      <p:grpSpPr>
-        <a:xfrm>
-          <a:off x="0" y="0"/>
-          <a:ext cx="0" cy="0"/>
-          <a:chOff x="0" y="0"/>
-          <a:chExt cx="0" cy="0"/>
-        </a:xfrm>
-      </p:grpSpPr>
-      <p:pic>
-        <p:nvPicPr>
-          <p:cNvPr id="7" name="Picture 6" descr="Screen Clipping"/>
-          <p:cNvPicPr>
-            <a:picLocks noChangeAspect="1"/>
-          </p:cNvPicPr>
-          <p:nvPr/>
-        </p:nvPicPr>
-        <p:blipFill>
-          <a:blip r:embed="rId2">
-            <a:extLst>
-              <a:ext uri="{28A0092B-C50C-407E-A947-70E740481C1C}">
-                <a14:useLocalDpi xmlns:a14="http://schemas.microsoft.com/office/drawing/2010/main" val="0"/>
-              </a:ext>
-            </a:extLst>
-          </a:blip>
-          <a:stretch>
-            <a:fillRect/>
-          </a:stretch>
-        </p:blipFill>
-        <p:spPr>
-          <a:xfrm>
-            <a:off x="266684" y="3054927"/>
-            <a:ext cx="6382641" cy="3448532"/>
-          </a:xfrm>
-          <a:prstGeom prst="rect">
-            <a:avLst/>
-          </a:prstGeom>
-        </p:spPr>
-      </p:pic>
-      <p:sp>
-        <p:nvSpPr>
-          <p:cNvPr id="2" name="Title 1"/>
-          <p:cNvSpPr>
-            <a:spLocks noGrp="1"/>
-          </p:cNvSpPr>
-          <p:nvPr>
-            <p:ph type="title"/>
-          </p:nvPr>
-        </p:nvSpPr>
-        <p:spPr/>
-        <p:txBody>
-          <a:bodyPr/>
-          <a:lstStyle/>
-          <a:p>
-            <a:r>
-              <a:rPr lang="en-US" dirty="0" err="1" smtClean="0"/>
-              <a:t>Thông</a:t>
-            </a:r>
-            <a:r>
-              <a:rPr lang="en-US" dirty="0" smtClean="0"/>
-              <a:t> tin </a:t>
-            </a:r>
-            <a:r>
-              <a:rPr lang="en-US" dirty="0" err="1" smtClean="0"/>
-              <a:t>thêm</a:t>
-            </a:r>
-            <a:endParaRPr lang="en-US" dirty="0"/>
-          </a:p>
-        </p:txBody>
-      </p:sp>
-      <p:sp>
-        <p:nvSpPr>
-          <p:cNvPr id="3" name="Content Placeholder 2"/>
-          <p:cNvSpPr>
-            <a:spLocks noGrp="1"/>
-          </p:cNvSpPr>
-          <p:nvPr>
-            <p:ph sz="quarter" idx="1"/>
-          </p:nvPr>
-        </p:nvSpPr>
-        <p:spPr/>
-        <p:txBody>
-          <a:bodyPr>
-            <a:normAutofit/>
-          </a:bodyPr>
-          <a:lstStyle/>
-          <a:p>
-            <a:pPr marL="0" indent="0">
-              <a:buNone/>
-            </a:pPr>
-            <a:r>
-              <a:rPr lang="en-US" sz="2400" dirty="0" smtClean="0"/>
-              <a:t>Ta </a:t>
-            </a:r>
-            <a:r>
-              <a:rPr lang="en-US" sz="2400" dirty="0" err="1" smtClean="0"/>
-              <a:t>cũng</a:t>
-            </a:r>
-            <a:r>
-              <a:rPr lang="en-US" sz="2400" dirty="0" smtClean="0"/>
-              <a:t> </a:t>
-            </a:r>
-            <a:r>
-              <a:rPr lang="en-US" sz="2400" dirty="0" err="1" smtClean="0"/>
-              <a:t>có</a:t>
-            </a:r>
-            <a:r>
-              <a:rPr lang="en-US" sz="2400" dirty="0" smtClean="0"/>
-              <a:t> </a:t>
-            </a:r>
-            <a:r>
-              <a:rPr lang="en-US" sz="2400" dirty="0" err="1" smtClean="0"/>
-              <a:t>thể</a:t>
-            </a:r>
-            <a:r>
-              <a:rPr lang="en-US" sz="2400" dirty="0" smtClean="0"/>
-              <a:t> </a:t>
-            </a:r>
-            <a:r>
-              <a:rPr lang="en-US" sz="2400" dirty="0" err="1" smtClean="0"/>
-              <a:t>tạo</a:t>
-            </a:r>
-            <a:r>
-              <a:rPr lang="en-US" sz="2400" dirty="0" smtClean="0"/>
-              <a:t> </a:t>
-            </a:r>
-            <a:r>
-              <a:rPr lang="en-US" sz="2400" dirty="0" err="1" smtClean="0"/>
-              <a:t>biến</a:t>
-            </a:r>
-            <a:r>
-              <a:rPr lang="en-US" sz="2400" dirty="0" smtClean="0"/>
-              <a:t> </a:t>
-            </a:r>
-            <a:r>
-              <a:rPr lang="en-US" sz="2400" dirty="0" err="1" smtClean="0"/>
-              <a:t>và</a:t>
-            </a:r>
-            <a:r>
-              <a:rPr lang="en-US" sz="2400" dirty="0" smtClean="0"/>
-              <a:t> </a:t>
-            </a:r>
-            <a:r>
-              <a:rPr lang="en-US" sz="2400" dirty="0" err="1" smtClean="0"/>
-              <a:t>xử</a:t>
-            </a:r>
-            <a:r>
-              <a:rPr lang="en-US" sz="2400" dirty="0" smtClean="0"/>
-              <a:t> </a:t>
-            </a:r>
-            <a:r>
-              <a:rPr lang="en-US" sz="2400" dirty="0" err="1" smtClean="0"/>
-              <a:t>lý</a:t>
-            </a:r>
-            <a:r>
-              <a:rPr lang="en-US" sz="2400" dirty="0" smtClean="0"/>
-              <a:t> </a:t>
-            </a:r>
-            <a:r>
-              <a:rPr lang="en-US" sz="2400" dirty="0" err="1" smtClean="0"/>
-              <a:t>biến</a:t>
-            </a:r>
-            <a:r>
-              <a:rPr lang="en-US" sz="2400" dirty="0" smtClean="0"/>
-              <a:t> </a:t>
-            </a:r>
-            <a:r>
-              <a:rPr lang="en-US" sz="2400" dirty="0" err="1" smtClean="0"/>
-              <a:t>trong</a:t>
-            </a:r>
-            <a:r>
-              <a:rPr lang="en-US" sz="2400" dirty="0" smtClean="0"/>
-              <a:t> </a:t>
-            </a:r>
-            <a:r>
-              <a:rPr lang="en-US" sz="2400" dirty="0" err="1" smtClean="0"/>
-              <a:t>khối</a:t>
-            </a:r>
-            <a:r>
-              <a:rPr lang="en-US" sz="2400" dirty="0" smtClean="0"/>
-              <a:t> </a:t>
-            </a:r>
-            <a:r>
-              <a:rPr lang="en-US" sz="2400" dirty="0" err="1" smtClean="0"/>
-              <a:t>lệnh</a:t>
-            </a:r>
-            <a:r>
-              <a:rPr lang="en-US" sz="2400" dirty="0" smtClean="0"/>
-              <a:t> catch… </a:t>
-            </a:r>
-          </a:p>
-          <a:p>
-            <a:pPr marL="0" indent="0">
-              <a:buNone/>
-            </a:pPr>
-            <a:r>
-              <a:rPr lang="en-US" sz="2400" dirty="0" err="1" smtClean="0"/>
-              <a:t>Các</a:t>
-            </a:r>
-            <a:r>
-              <a:rPr lang="en-US" sz="2400" dirty="0" smtClean="0"/>
-              <a:t> </a:t>
-            </a:r>
-            <a:r>
-              <a:rPr lang="en-US" sz="2400" dirty="0" err="1" smtClean="0"/>
-              <a:t>biến</a:t>
-            </a:r>
-            <a:r>
-              <a:rPr lang="en-US" sz="2400" dirty="0" smtClean="0"/>
-              <a:t> </a:t>
-            </a:r>
-            <a:r>
-              <a:rPr lang="en-US" sz="2400" dirty="0" err="1" smtClean="0"/>
-              <a:t>trong</a:t>
-            </a:r>
-            <a:r>
-              <a:rPr lang="en-US" sz="2400" dirty="0" smtClean="0"/>
-              <a:t> </a:t>
-            </a:r>
-            <a:r>
-              <a:rPr lang="en-US" sz="2400" dirty="0" err="1" smtClean="0"/>
-              <a:t>khối</a:t>
-            </a:r>
-            <a:r>
-              <a:rPr lang="en-US" sz="2400" dirty="0" smtClean="0"/>
-              <a:t> </a:t>
-            </a:r>
-            <a:r>
-              <a:rPr lang="en-US" sz="2400" dirty="0" err="1" smtClean="0"/>
-              <a:t>lệnh</a:t>
-            </a:r>
-            <a:r>
-              <a:rPr lang="en-US" sz="2400" dirty="0" smtClean="0"/>
-              <a:t> catch… </a:t>
-            </a:r>
-            <a:r>
-              <a:rPr lang="en-US" sz="2400" dirty="0" err="1" smtClean="0"/>
-              <a:t>được</a:t>
-            </a:r>
-            <a:r>
-              <a:rPr lang="en-US" sz="2400" dirty="0" smtClean="0"/>
-              <a:t> </a:t>
-            </a:r>
-            <a:r>
-              <a:rPr lang="en-US" sz="2400" dirty="0" err="1" smtClean="0"/>
-              <a:t>thực</a:t>
-            </a:r>
-            <a:r>
-              <a:rPr lang="en-US" sz="2400" dirty="0" smtClean="0"/>
-              <a:t> </a:t>
-            </a:r>
-            <a:r>
-              <a:rPr lang="en-US" sz="2400" dirty="0" err="1" smtClean="0"/>
-              <a:t>thi</a:t>
-            </a:r>
-            <a:r>
-              <a:rPr lang="en-US" sz="2400" dirty="0" smtClean="0"/>
-              <a:t> </a:t>
-            </a:r>
-            <a:r>
-              <a:rPr lang="en-US" sz="2400" dirty="0" err="1" smtClean="0"/>
-              <a:t>khi</a:t>
-            </a:r>
-            <a:r>
-              <a:rPr lang="en-US" sz="2400" dirty="0" smtClean="0"/>
-              <a:t> </a:t>
-            </a:r>
-            <a:r>
-              <a:rPr lang="en-US" sz="2400" dirty="0" err="1" smtClean="0"/>
-              <a:t>có</a:t>
-            </a:r>
-            <a:r>
-              <a:rPr lang="en-US" sz="2400" dirty="0" smtClean="0"/>
-              <a:t> </a:t>
-            </a:r>
-            <a:r>
-              <a:rPr lang="en-US" sz="2400" dirty="0" err="1" smtClean="0"/>
-              <a:t>ngoại</a:t>
-            </a:r>
-            <a:r>
-              <a:rPr lang="en-US" sz="2400" dirty="0" smtClean="0"/>
-              <a:t> </a:t>
-            </a:r>
-            <a:r>
-              <a:rPr lang="en-US" sz="2400" dirty="0" err="1" smtClean="0"/>
-              <a:t>lệ</a:t>
-            </a:r>
-            <a:r>
-              <a:rPr lang="en-US" sz="2400" dirty="0" smtClean="0"/>
-              <a:t> </a:t>
-            </a:r>
-            <a:r>
-              <a:rPr lang="en-US" sz="2400" dirty="0" err="1" smtClean="0"/>
-              <a:t>xảy</a:t>
-            </a:r>
-            <a:r>
-              <a:rPr lang="en-US" sz="2400" dirty="0" smtClean="0"/>
-              <a:t> </a:t>
-            </a:r>
-            <a:r>
-              <a:rPr lang="en-US" sz="2400" dirty="0" err="1" smtClean="0"/>
-              <a:t>ra</a:t>
-            </a:r>
-            <a:r>
-              <a:rPr lang="en-US" sz="2400" dirty="0" smtClean="0"/>
-              <a:t>, </a:t>
-            </a:r>
-            <a:r>
-              <a:rPr lang="en-US" sz="2400" dirty="0" err="1" smtClean="0"/>
-              <a:t>tương</a:t>
-            </a:r>
-            <a:r>
-              <a:rPr lang="en-US" sz="2400" dirty="0" smtClean="0"/>
-              <a:t> </a:t>
-            </a:r>
-            <a:r>
-              <a:rPr lang="en-US" sz="2400" dirty="0" err="1" smtClean="0"/>
-              <a:t>tự</a:t>
-            </a:r>
-            <a:r>
-              <a:rPr lang="en-US" sz="2400" dirty="0" smtClean="0"/>
-              <a:t> </a:t>
-            </a:r>
-            <a:r>
-              <a:rPr lang="en-US" sz="2400" dirty="0" err="1" smtClean="0"/>
-              <a:t>như</a:t>
-            </a:r>
-            <a:r>
-              <a:rPr lang="en-US" sz="2400" dirty="0" smtClean="0"/>
-              <a:t> if…else</a:t>
-            </a:r>
-          </a:p>
-        </p:txBody>
-      </p:sp>
-      <p:sp>
-        <p:nvSpPr>
-          <p:cNvPr id="6" name="TextBox 5"/>
-          <p:cNvSpPr txBox="1"/>
-          <p:nvPr/>
-        </p:nvSpPr>
-        <p:spPr>
-          <a:xfrm>
-            <a:off x="6553200" y="4953000"/>
-            <a:ext cx="2290114" cy="369332"/>
-          </a:xfrm>
-          <a:prstGeom prst="rect">
-            <a:avLst/>
-          </a:prstGeom>
-          <a:noFill/>
-        </p:spPr>
-        <p:txBody>
-          <a:bodyPr wrap="none" rtlCol="0">
-            <a:spAutoFit/>
-          </a:bodyPr>
-          <a:lstStyle/>
-          <a:p>
-            <a:r>
-              <a:rPr lang="en-US" dirty="0" err="1"/>
-              <a:t>Kết</a:t>
-            </a:r>
-            <a:r>
-              <a:rPr lang="en-US" dirty="0"/>
-              <a:t> </a:t>
-            </a:r>
-            <a:r>
-              <a:rPr lang="en-US" dirty="0" err="1"/>
-              <a:t>quả</a:t>
-            </a:r>
-            <a:r>
-              <a:rPr lang="en-US" dirty="0"/>
-              <a:t> </a:t>
-            </a:r>
-            <a:r>
-              <a:rPr lang="en-US" dirty="0" err="1"/>
-              <a:t>khi</a:t>
-            </a:r>
-            <a:r>
-              <a:rPr lang="en-US" dirty="0"/>
-              <a:t> </a:t>
-            </a:r>
-            <a:r>
-              <a:rPr lang="en-US" dirty="0" err="1"/>
-              <a:t>có</a:t>
-            </a:r>
-            <a:r>
-              <a:rPr lang="en-US" dirty="0"/>
-              <a:t> </a:t>
-            </a:r>
-            <a:r>
-              <a:rPr lang="en-US" dirty="0" err="1"/>
-              <a:t>ngoại</a:t>
-            </a:r>
-            <a:r>
-              <a:rPr lang="en-US" dirty="0"/>
-              <a:t> </a:t>
-            </a:r>
-            <a:r>
-              <a:rPr lang="en-US" dirty="0" err="1"/>
-              <a:t>lệ</a:t>
-            </a:r>
-            <a:endParaRPr lang="en-US" dirty="0"/>
-          </a:p>
-        </p:txBody>
-      </p:sp>
-      <p:pic>
-        <p:nvPicPr>
-          <p:cNvPr id="4" name="Picture 3" descr="Screen Clipping"/>
-          <p:cNvPicPr>
-            <a:picLocks noChangeAspect="1"/>
-          </p:cNvPicPr>
-          <p:nvPr/>
-        </p:nvPicPr>
-        <p:blipFill>
-          <a:blip r:embed="rId3">
-            <a:extLst>
-              <a:ext uri="{28A0092B-C50C-407E-A947-70E740481C1C}">
-                <a14:useLocalDpi xmlns:a14="http://schemas.microsoft.com/office/drawing/2010/main" val="0"/>
-              </a:ext>
-            </a:extLst>
-          </a:blip>
-          <a:stretch>
-            <a:fillRect/>
-          </a:stretch>
-        </p:blipFill>
-        <p:spPr>
-          <a:xfrm>
-            <a:off x="5181600" y="5715000"/>
-            <a:ext cx="3877216" cy="933580"/>
-          </a:xfrm>
-          <a:prstGeom prst="rect">
-            <a:avLst/>
-          </a:prstGeom>
-        </p:spPr>
-      </p:pic>
-    </p:spTree>
-    <p:extLst>
-      <p:ext uri="{BB962C8B-B14F-4D97-AF65-F5344CB8AC3E}">
-        <p14:creationId xmlns:p14="http://schemas.microsoft.com/office/powerpoint/2010/main" val="1668306685"/>
       </p:ext>
     </p:extLst>
   </p:cSld>
@@ -8605,6 +8142,900 @@
           <a:chExt cx="0" cy="0"/>
         </a:xfrm>
       </p:grpSpPr>
+      <p:pic>
+        <p:nvPicPr>
+          <p:cNvPr id="7" name="Picture 6" descr="Screen Clipping"/>
+          <p:cNvPicPr>
+            <a:picLocks noChangeAspect="1"/>
+          </p:cNvPicPr>
+          <p:nvPr/>
+        </p:nvPicPr>
+        <p:blipFill>
+          <a:blip r:embed="rId2">
+            <a:extLst>
+              <a:ext uri="{28A0092B-C50C-407E-A947-70E740481C1C}">
+                <a14:useLocalDpi xmlns:a14="http://schemas.microsoft.com/office/drawing/2010/main" val="0"/>
+              </a:ext>
+            </a:extLst>
+          </a:blip>
+          <a:stretch>
+            <a:fillRect/>
+          </a:stretch>
+        </p:blipFill>
+        <p:spPr>
+          <a:xfrm>
+            <a:off x="266684" y="3054927"/>
+            <a:ext cx="6382641" cy="3448532"/>
+          </a:xfrm>
+          <a:prstGeom prst="rect">
+            <a:avLst/>
+          </a:prstGeom>
+        </p:spPr>
+      </p:pic>
+      <p:sp>
+        <p:nvSpPr>
+          <p:cNvPr id="2" name="Title 1"/>
+          <p:cNvSpPr>
+            <a:spLocks noGrp="1"/>
+          </p:cNvSpPr>
+          <p:nvPr>
+            <p:ph type="title"/>
+          </p:nvPr>
+        </p:nvSpPr>
+        <p:spPr/>
+        <p:txBody>
+          <a:bodyPr/>
+          <a:lstStyle/>
+          <a:p>
+            <a:r>
+              <a:rPr lang="en-US" dirty="0" err="1" smtClean="0"/>
+              <a:t>Thông</a:t>
+            </a:r>
+            <a:r>
+              <a:rPr lang="en-US" dirty="0" smtClean="0"/>
+              <a:t> tin </a:t>
+            </a:r>
+            <a:r>
+              <a:rPr lang="en-US" dirty="0" err="1" smtClean="0"/>
+              <a:t>thêm</a:t>
+            </a:r>
+            <a:endParaRPr lang="en-US" dirty="0"/>
+          </a:p>
+        </p:txBody>
+      </p:sp>
+      <p:sp>
+        <p:nvSpPr>
+          <p:cNvPr id="3" name="Content Placeholder 2"/>
+          <p:cNvSpPr>
+            <a:spLocks noGrp="1"/>
+          </p:cNvSpPr>
+          <p:nvPr>
+            <p:ph sz="quarter" idx="1"/>
+          </p:nvPr>
+        </p:nvSpPr>
+        <p:spPr/>
+        <p:txBody>
+          <a:bodyPr>
+            <a:normAutofit/>
+          </a:bodyPr>
+          <a:lstStyle/>
+          <a:p>
+            <a:pPr marL="0" indent="0">
+              <a:buNone/>
+            </a:pPr>
+            <a:r>
+              <a:rPr lang="en-US" sz="2400" dirty="0" smtClean="0"/>
+              <a:t>Ta </a:t>
+            </a:r>
+            <a:r>
+              <a:rPr lang="en-US" sz="2400" dirty="0" err="1" smtClean="0"/>
+              <a:t>cũng</a:t>
+            </a:r>
+            <a:r>
+              <a:rPr lang="en-US" sz="2400" dirty="0" smtClean="0"/>
+              <a:t> </a:t>
+            </a:r>
+            <a:r>
+              <a:rPr lang="en-US" sz="2400" dirty="0" err="1" smtClean="0"/>
+              <a:t>có</a:t>
+            </a:r>
+            <a:r>
+              <a:rPr lang="en-US" sz="2400" dirty="0" smtClean="0"/>
+              <a:t> </a:t>
+            </a:r>
+            <a:r>
+              <a:rPr lang="en-US" sz="2400" dirty="0" err="1" smtClean="0"/>
+              <a:t>thể</a:t>
+            </a:r>
+            <a:r>
+              <a:rPr lang="en-US" sz="2400" dirty="0" smtClean="0"/>
+              <a:t> </a:t>
+            </a:r>
+            <a:r>
+              <a:rPr lang="en-US" sz="2400" dirty="0" err="1" smtClean="0"/>
+              <a:t>tạo</a:t>
+            </a:r>
+            <a:r>
+              <a:rPr lang="en-US" sz="2400" dirty="0" smtClean="0"/>
+              <a:t> </a:t>
+            </a:r>
+            <a:r>
+              <a:rPr lang="en-US" sz="2400" dirty="0" err="1" smtClean="0"/>
+              <a:t>biến</a:t>
+            </a:r>
+            <a:r>
+              <a:rPr lang="en-US" sz="2400" dirty="0" smtClean="0"/>
+              <a:t> </a:t>
+            </a:r>
+            <a:r>
+              <a:rPr lang="en-US" sz="2400" dirty="0" err="1" smtClean="0"/>
+              <a:t>và</a:t>
+            </a:r>
+            <a:r>
+              <a:rPr lang="en-US" sz="2400" dirty="0" smtClean="0"/>
+              <a:t> </a:t>
+            </a:r>
+            <a:r>
+              <a:rPr lang="en-US" sz="2400" dirty="0" err="1" smtClean="0"/>
+              <a:t>xử</a:t>
+            </a:r>
+            <a:r>
+              <a:rPr lang="en-US" sz="2400" dirty="0" smtClean="0"/>
+              <a:t> </a:t>
+            </a:r>
+            <a:r>
+              <a:rPr lang="en-US" sz="2400" dirty="0" err="1" smtClean="0"/>
+              <a:t>lý</a:t>
+            </a:r>
+            <a:r>
+              <a:rPr lang="en-US" sz="2400" dirty="0" smtClean="0"/>
+              <a:t> </a:t>
+            </a:r>
+            <a:r>
+              <a:rPr lang="en-US" sz="2400" dirty="0" err="1" smtClean="0"/>
+              <a:t>biến</a:t>
+            </a:r>
+            <a:r>
+              <a:rPr lang="en-US" sz="2400" dirty="0" smtClean="0"/>
+              <a:t> </a:t>
+            </a:r>
+            <a:r>
+              <a:rPr lang="en-US" sz="2400" dirty="0" err="1" smtClean="0"/>
+              <a:t>trong</a:t>
+            </a:r>
+            <a:r>
+              <a:rPr lang="en-US" sz="2400" dirty="0" smtClean="0"/>
+              <a:t> </a:t>
+            </a:r>
+            <a:r>
+              <a:rPr lang="en-US" sz="2400" dirty="0" err="1" smtClean="0"/>
+              <a:t>khối</a:t>
+            </a:r>
+            <a:r>
+              <a:rPr lang="en-US" sz="2400" dirty="0" smtClean="0"/>
+              <a:t> </a:t>
+            </a:r>
+            <a:r>
+              <a:rPr lang="en-US" sz="2400" dirty="0" err="1" smtClean="0"/>
+              <a:t>lệnh</a:t>
+            </a:r>
+            <a:r>
+              <a:rPr lang="en-US" sz="2400" dirty="0" smtClean="0"/>
+              <a:t> catch… </a:t>
+            </a:r>
+          </a:p>
+          <a:p>
+            <a:pPr marL="0" indent="0">
+              <a:buNone/>
+            </a:pPr>
+            <a:r>
+              <a:rPr lang="en-US" sz="2400" dirty="0" err="1" smtClean="0"/>
+              <a:t>Các</a:t>
+            </a:r>
+            <a:r>
+              <a:rPr lang="en-US" sz="2400" dirty="0" smtClean="0"/>
+              <a:t> </a:t>
+            </a:r>
+            <a:r>
+              <a:rPr lang="en-US" sz="2400" dirty="0" err="1" smtClean="0"/>
+              <a:t>biến</a:t>
+            </a:r>
+            <a:r>
+              <a:rPr lang="en-US" sz="2400" dirty="0" smtClean="0"/>
+              <a:t> </a:t>
+            </a:r>
+            <a:r>
+              <a:rPr lang="en-US" sz="2400" dirty="0" err="1" smtClean="0"/>
+              <a:t>trong</a:t>
+            </a:r>
+            <a:r>
+              <a:rPr lang="en-US" sz="2400" dirty="0" smtClean="0"/>
+              <a:t> </a:t>
+            </a:r>
+            <a:r>
+              <a:rPr lang="en-US" sz="2400" dirty="0" err="1" smtClean="0"/>
+              <a:t>khối</a:t>
+            </a:r>
+            <a:r>
+              <a:rPr lang="en-US" sz="2400" dirty="0" smtClean="0"/>
+              <a:t> </a:t>
+            </a:r>
+            <a:r>
+              <a:rPr lang="en-US" sz="2400" dirty="0" err="1" smtClean="0"/>
+              <a:t>lệnh</a:t>
+            </a:r>
+            <a:r>
+              <a:rPr lang="en-US" sz="2400" dirty="0" smtClean="0"/>
+              <a:t> catch… </a:t>
+            </a:r>
+            <a:r>
+              <a:rPr lang="en-US" sz="2400" dirty="0" err="1" smtClean="0"/>
+              <a:t>được</a:t>
+            </a:r>
+            <a:r>
+              <a:rPr lang="en-US" sz="2400" dirty="0" smtClean="0"/>
+              <a:t> </a:t>
+            </a:r>
+            <a:r>
+              <a:rPr lang="en-US" sz="2400" dirty="0" err="1" smtClean="0"/>
+              <a:t>thực</a:t>
+            </a:r>
+            <a:r>
+              <a:rPr lang="en-US" sz="2400" dirty="0" smtClean="0"/>
+              <a:t> </a:t>
+            </a:r>
+            <a:r>
+              <a:rPr lang="en-US" sz="2400" dirty="0" err="1" smtClean="0"/>
+              <a:t>thi</a:t>
+            </a:r>
+            <a:r>
+              <a:rPr lang="en-US" sz="2400" dirty="0" smtClean="0"/>
+              <a:t> </a:t>
+            </a:r>
+            <a:r>
+              <a:rPr lang="en-US" sz="2400" dirty="0" err="1" smtClean="0"/>
+              <a:t>khi</a:t>
+            </a:r>
+            <a:r>
+              <a:rPr lang="en-US" sz="2400" dirty="0" smtClean="0"/>
+              <a:t> </a:t>
+            </a:r>
+            <a:r>
+              <a:rPr lang="en-US" sz="2400" dirty="0" err="1" smtClean="0"/>
+              <a:t>có</a:t>
+            </a:r>
+            <a:r>
+              <a:rPr lang="en-US" sz="2400" dirty="0" smtClean="0"/>
+              <a:t> </a:t>
+            </a:r>
+            <a:r>
+              <a:rPr lang="en-US" sz="2400" dirty="0" err="1" smtClean="0"/>
+              <a:t>ngoại</a:t>
+            </a:r>
+            <a:r>
+              <a:rPr lang="en-US" sz="2400" dirty="0" smtClean="0"/>
+              <a:t> </a:t>
+            </a:r>
+            <a:r>
+              <a:rPr lang="en-US" sz="2400" dirty="0" err="1" smtClean="0"/>
+              <a:t>lệ</a:t>
+            </a:r>
+            <a:r>
+              <a:rPr lang="en-US" sz="2400" dirty="0" smtClean="0"/>
+              <a:t> </a:t>
+            </a:r>
+            <a:r>
+              <a:rPr lang="en-US" sz="2400" dirty="0" err="1" smtClean="0"/>
+              <a:t>xảy</a:t>
+            </a:r>
+            <a:r>
+              <a:rPr lang="en-US" sz="2400" dirty="0" smtClean="0"/>
+              <a:t> </a:t>
+            </a:r>
+            <a:r>
+              <a:rPr lang="en-US" sz="2400" dirty="0" err="1" smtClean="0"/>
+              <a:t>ra</a:t>
+            </a:r>
+            <a:r>
+              <a:rPr lang="en-US" sz="2400" dirty="0" smtClean="0"/>
+              <a:t>, </a:t>
+            </a:r>
+            <a:r>
+              <a:rPr lang="en-US" sz="2400" dirty="0" err="1" smtClean="0"/>
+              <a:t>tương</a:t>
+            </a:r>
+            <a:r>
+              <a:rPr lang="en-US" sz="2400" dirty="0" smtClean="0"/>
+              <a:t> </a:t>
+            </a:r>
+            <a:r>
+              <a:rPr lang="en-US" sz="2400" dirty="0" err="1" smtClean="0"/>
+              <a:t>tự</a:t>
+            </a:r>
+            <a:r>
+              <a:rPr lang="en-US" sz="2400" dirty="0" smtClean="0"/>
+              <a:t> </a:t>
+            </a:r>
+            <a:r>
+              <a:rPr lang="en-US" sz="2400" dirty="0" err="1" smtClean="0"/>
+              <a:t>như</a:t>
+            </a:r>
+            <a:r>
+              <a:rPr lang="en-US" sz="2400" dirty="0" smtClean="0"/>
+              <a:t> if…else</a:t>
+            </a:r>
+          </a:p>
+        </p:txBody>
+      </p:sp>
+      <p:pic>
+        <p:nvPicPr>
+          <p:cNvPr id="5" name="Picture 4" descr="Screen Clipping"/>
+          <p:cNvPicPr>
+            <a:picLocks noChangeAspect="1"/>
+          </p:cNvPicPr>
+          <p:nvPr/>
+        </p:nvPicPr>
+        <p:blipFill>
+          <a:blip r:embed="rId3">
+            <a:extLst>
+              <a:ext uri="{28A0092B-C50C-407E-A947-70E740481C1C}">
+                <a14:useLocalDpi xmlns:a14="http://schemas.microsoft.com/office/drawing/2010/main" val="0"/>
+              </a:ext>
+            </a:extLst>
+          </a:blip>
+          <a:stretch>
+            <a:fillRect/>
+          </a:stretch>
+        </p:blipFill>
+        <p:spPr>
+          <a:xfrm>
+            <a:off x="7049655" y="5181600"/>
+            <a:ext cx="2057400" cy="925830"/>
+          </a:xfrm>
+          <a:prstGeom prst="rect">
+            <a:avLst/>
+          </a:prstGeom>
+        </p:spPr>
+      </p:pic>
+      <p:sp>
+        <p:nvSpPr>
+          <p:cNvPr id="6" name="TextBox 5"/>
+          <p:cNvSpPr txBox="1"/>
+          <p:nvPr/>
+        </p:nvSpPr>
+        <p:spPr>
+          <a:xfrm>
+            <a:off x="6858000" y="4242706"/>
+            <a:ext cx="2125325" cy="369332"/>
+          </a:xfrm>
+          <a:prstGeom prst="rect">
+            <a:avLst/>
+          </a:prstGeom>
+          <a:noFill/>
+        </p:spPr>
+        <p:txBody>
+          <a:bodyPr wrap="none" rtlCol="0">
+            <a:spAutoFit/>
+          </a:bodyPr>
+          <a:lstStyle/>
+          <a:p>
+            <a:r>
+              <a:rPr lang="en-US" dirty="0" err="1" smtClean="0"/>
+              <a:t>Kết</a:t>
+            </a:r>
+            <a:r>
+              <a:rPr lang="en-US" dirty="0" smtClean="0"/>
+              <a:t> </a:t>
+            </a:r>
+            <a:r>
+              <a:rPr lang="en-US" dirty="0" err="1" smtClean="0"/>
+              <a:t>quả</a:t>
+            </a:r>
+            <a:r>
+              <a:rPr lang="en-US" dirty="0" smtClean="0"/>
+              <a:t> </a:t>
+            </a:r>
+            <a:r>
+              <a:rPr lang="en-US" dirty="0" err="1" smtClean="0"/>
+              <a:t>bình</a:t>
+            </a:r>
+            <a:r>
+              <a:rPr lang="en-US" dirty="0" smtClean="0"/>
+              <a:t> </a:t>
+            </a:r>
+            <a:r>
+              <a:rPr lang="en-US" dirty="0" err="1" smtClean="0"/>
+              <a:t>thường</a:t>
+            </a:r>
+            <a:endParaRPr lang="en-US" dirty="0"/>
+          </a:p>
+        </p:txBody>
+      </p:sp>
+    </p:spTree>
+    <p:extLst>
+      <p:ext uri="{BB962C8B-B14F-4D97-AF65-F5344CB8AC3E}">
+        <p14:creationId xmlns:p14="http://schemas.microsoft.com/office/powerpoint/2010/main" val="235308845"/>
+      </p:ext>
+    </p:extLst>
+  </p:cSld>
+  <p:clrMapOvr>
+    <a:masterClrMapping/>
+  </p:clrMapOvr>
+</p:sld>
+</file>
+
+<file path=ppt/slides/slide21.xml><?xml version="1.0" encoding="utf-8"?>
+<p:sld xmlns:a="http://schemas.openxmlformats.org/drawingml/2006/main" xmlns:r="http://schemas.openxmlformats.org/officeDocument/2006/relationships" xmlns:p="http://schemas.openxmlformats.org/presentationml/2006/main">
+  <p:cSld>
+    <p:spTree>
+      <p:nvGrpSpPr>
+        <p:cNvPr id="1" name=""/>
+        <p:cNvGrpSpPr/>
+        <p:nvPr/>
+      </p:nvGrpSpPr>
+      <p:grpSpPr>
+        <a:xfrm>
+          <a:off x="0" y="0"/>
+          <a:ext cx="0" cy="0"/>
+          <a:chOff x="0" y="0"/>
+          <a:chExt cx="0" cy="0"/>
+        </a:xfrm>
+      </p:grpSpPr>
+      <p:pic>
+        <p:nvPicPr>
+          <p:cNvPr id="7" name="Picture 6" descr="Screen Clipping"/>
+          <p:cNvPicPr>
+            <a:picLocks noChangeAspect="1"/>
+          </p:cNvPicPr>
+          <p:nvPr/>
+        </p:nvPicPr>
+        <p:blipFill>
+          <a:blip r:embed="rId2">
+            <a:extLst>
+              <a:ext uri="{28A0092B-C50C-407E-A947-70E740481C1C}">
+                <a14:useLocalDpi xmlns:a14="http://schemas.microsoft.com/office/drawing/2010/main" val="0"/>
+              </a:ext>
+            </a:extLst>
+          </a:blip>
+          <a:stretch>
+            <a:fillRect/>
+          </a:stretch>
+        </p:blipFill>
+        <p:spPr>
+          <a:xfrm>
+            <a:off x="266684" y="3054927"/>
+            <a:ext cx="6382641" cy="3448532"/>
+          </a:xfrm>
+          <a:prstGeom prst="rect">
+            <a:avLst/>
+          </a:prstGeom>
+        </p:spPr>
+      </p:pic>
+      <p:sp>
+        <p:nvSpPr>
+          <p:cNvPr id="2" name="Title 1"/>
+          <p:cNvSpPr>
+            <a:spLocks noGrp="1"/>
+          </p:cNvSpPr>
+          <p:nvPr>
+            <p:ph type="title"/>
+          </p:nvPr>
+        </p:nvSpPr>
+        <p:spPr/>
+        <p:txBody>
+          <a:bodyPr/>
+          <a:lstStyle/>
+          <a:p>
+            <a:r>
+              <a:rPr lang="en-US" dirty="0" err="1" smtClean="0"/>
+              <a:t>Thông</a:t>
+            </a:r>
+            <a:r>
+              <a:rPr lang="en-US" dirty="0" smtClean="0"/>
+              <a:t> tin </a:t>
+            </a:r>
+            <a:r>
+              <a:rPr lang="en-US" dirty="0" err="1" smtClean="0"/>
+              <a:t>thêm</a:t>
+            </a:r>
+            <a:endParaRPr lang="en-US" dirty="0"/>
+          </a:p>
+        </p:txBody>
+      </p:sp>
+      <p:sp>
+        <p:nvSpPr>
+          <p:cNvPr id="3" name="Content Placeholder 2"/>
+          <p:cNvSpPr>
+            <a:spLocks noGrp="1"/>
+          </p:cNvSpPr>
+          <p:nvPr>
+            <p:ph sz="quarter" idx="1"/>
+          </p:nvPr>
+        </p:nvSpPr>
+        <p:spPr/>
+        <p:txBody>
+          <a:bodyPr>
+            <a:normAutofit/>
+          </a:bodyPr>
+          <a:lstStyle/>
+          <a:p>
+            <a:pPr marL="0" indent="0">
+              <a:buNone/>
+            </a:pPr>
+            <a:r>
+              <a:rPr lang="en-US" sz="2400" dirty="0" smtClean="0"/>
+              <a:t>Ta </a:t>
+            </a:r>
+            <a:r>
+              <a:rPr lang="en-US" sz="2400" dirty="0" err="1" smtClean="0"/>
+              <a:t>cũng</a:t>
+            </a:r>
+            <a:r>
+              <a:rPr lang="en-US" sz="2400" dirty="0" smtClean="0"/>
+              <a:t> </a:t>
+            </a:r>
+            <a:r>
+              <a:rPr lang="en-US" sz="2400" dirty="0" err="1" smtClean="0"/>
+              <a:t>có</a:t>
+            </a:r>
+            <a:r>
+              <a:rPr lang="en-US" sz="2400" dirty="0" smtClean="0"/>
+              <a:t> </a:t>
+            </a:r>
+            <a:r>
+              <a:rPr lang="en-US" sz="2400" dirty="0" err="1" smtClean="0"/>
+              <a:t>thể</a:t>
+            </a:r>
+            <a:r>
+              <a:rPr lang="en-US" sz="2400" dirty="0" smtClean="0"/>
+              <a:t> </a:t>
+            </a:r>
+            <a:r>
+              <a:rPr lang="en-US" sz="2400" dirty="0" err="1" smtClean="0"/>
+              <a:t>tạo</a:t>
+            </a:r>
+            <a:r>
+              <a:rPr lang="en-US" sz="2400" dirty="0" smtClean="0"/>
+              <a:t> </a:t>
+            </a:r>
+            <a:r>
+              <a:rPr lang="en-US" sz="2400" dirty="0" err="1" smtClean="0"/>
+              <a:t>biến</a:t>
+            </a:r>
+            <a:r>
+              <a:rPr lang="en-US" sz="2400" dirty="0" smtClean="0"/>
+              <a:t> </a:t>
+            </a:r>
+            <a:r>
+              <a:rPr lang="en-US" sz="2400" dirty="0" err="1" smtClean="0"/>
+              <a:t>và</a:t>
+            </a:r>
+            <a:r>
+              <a:rPr lang="en-US" sz="2400" dirty="0" smtClean="0"/>
+              <a:t> </a:t>
+            </a:r>
+            <a:r>
+              <a:rPr lang="en-US" sz="2400" dirty="0" err="1" smtClean="0"/>
+              <a:t>xử</a:t>
+            </a:r>
+            <a:r>
+              <a:rPr lang="en-US" sz="2400" dirty="0" smtClean="0"/>
+              <a:t> </a:t>
+            </a:r>
+            <a:r>
+              <a:rPr lang="en-US" sz="2400" dirty="0" err="1" smtClean="0"/>
+              <a:t>lý</a:t>
+            </a:r>
+            <a:r>
+              <a:rPr lang="en-US" sz="2400" dirty="0" smtClean="0"/>
+              <a:t> </a:t>
+            </a:r>
+            <a:r>
+              <a:rPr lang="en-US" sz="2400" dirty="0" err="1" smtClean="0"/>
+              <a:t>biến</a:t>
+            </a:r>
+            <a:r>
+              <a:rPr lang="en-US" sz="2400" dirty="0" smtClean="0"/>
+              <a:t> </a:t>
+            </a:r>
+            <a:r>
+              <a:rPr lang="en-US" sz="2400" dirty="0" err="1" smtClean="0"/>
+              <a:t>trong</a:t>
+            </a:r>
+            <a:r>
+              <a:rPr lang="en-US" sz="2400" dirty="0" smtClean="0"/>
+              <a:t> </a:t>
+            </a:r>
+            <a:r>
+              <a:rPr lang="en-US" sz="2400" dirty="0" err="1" smtClean="0"/>
+              <a:t>khối</a:t>
+            </a:r>
+            <a:r>
+              <a:rPr lang="en-US" sz="2400" dirty="0" smtClean="0"/>
+              <a:t> </a:t>
+            </a:r>
+            <a:r>
+              <a:rPr lang="en-US" sz="2400" dirty="0" err="1" smtClean="0"/>
+              <a:t>lệnh</a:t>
+            </a:r>
+            <a:r>
+              <a:rPr lang="en-US" sz="2400" dirty="0" smtClean="0"/>
+              <a:t> catch… </a:t>
+            </a:r>
+          </a:p>
+          <a:p>
+            <a:pPr marL="0" indent="0">
+              <a:buNone/>
+            </a:pPr>
+            <a:r>
+              <a:rPr lang="en-US" sz="2400" dirty="0" err="1" smtClean="0"/>
+              <a:t>Các</a:t>
+            </a:r>
+            <a:r>
+              <a:rPr lang="en-US" sz="2400" dirty="0" smtClean="0"/>
+              <a:t> </a:t>
+            </a:r>
+            <a:r>
+              <a:rPr lang="en-US" sz="2400" dirty="0" err="1" smtClean="0"/>
+              <a:t>biến</a:t>
+            </a:r>
+            <a:r>
+              <a:rPr lang="en-US" sz="2400" dirty="0" smtClean="0"/>
+              <a:t> </a:t>
+            </a:r>
+            <a:r>
+              <a:rPr lang="en-US" sz="2400" dirty="0" err="1" smtClean="0"/>
+              <a:t>trong</a:t>
+            </a:r>
+            <a:r>
+              <a:rPr lang="en-US" sz="2400" dirty="0" smtClean="0"/>
+              <a:t> </a:t>
+            </a:r>
+            <a:r>
+              <a:rPr lang="en-US" sz="2400" dirty="0" err="1" smtClean="0"/>
+              <a:t>khối</a:t>
+            </a:r>
+            <a:r>
+              <a:rPr lang="en-US" sz="2400" dirty="0" smtClean="0"/>
+              <a:t> </a:t>
+            </a:r>
+            <a:r>
+              <a:rPr lang="en-US" sz="2400" dirty="0" err="1" smtClean="0"/>
+              <a:t>lệnh</a:t>
+            </a:r>
+            <a:r>
+              <a:rPr lang="en-US" sz="2400" dirty="0" smtClean="0"/>
+              <a:t> catch… </a:t>
+            </a:r>
+            <a:r>
+              <a:rPr lang="en-US" sz="2400" dirty="0" err="1" smtClean="0"/>
+              <a:t>được</a:t>
+            </a:r>
+            <a:r>
+              <a:rPr lang="en-US" sz="2400" dirty="0" smtClean="0"/>
+              <a:t> </a:t>
+            </a:r>
+            <a:r>
+              <a:rPr lang="en-US" sz="2400" dirty="0" err="1" smtClean="0"/>
+              <a:t>thực</a:t>
+            </a:r>
+            <a:r>
+              <a:rPr lang="en-US" sz="2400" dirty="0" smtClean="0"/>
+              <a:t> </a:t>
+            </a:r>
+            <a:r>
+              <a:rPr lang="en-US" sz="2400" dirty="0" err="1" smtClean="0"/>
+              <a:t>thi</a:t>
+            </a:r>
+            <a:r>
+              <a:rPr lang="en-US" sz="2400" dirty="0" smtClean="0"/>
+              <a:t> </a:t>
+            </a:r>
+            <a:r>
+              <a:rPr lang="en-US" sz="2400" dirty="0" err="1" smtClean="0"/>
+              <a:t>khi</a:t>
+            </a:r>
+            <a:r>
+              <a:rPr lang="en-US" sz="2400" dirty="0" smtClean="0"/>
+              <a:t> </a:t>
+            </a:r>
+            <a:r>
+              <a:rPr lang="en-US" sz="2400" dirty="0" err="1" smtClean="0"/>
+              <a:t>có</a:t>
+            </a:r>
+            <a:r>
+              <a:rPr lang="en-US" sz="2400" dirty="0" smtClean="0"/>
+              <a:t> </a:t>
+            </a:r>
+            <a:r>
+              <a:rPr lang="en-US" sz="2400" dirty="0" err="1" smtClean="0"/>
+              <a:t>ngoại</a:t>
+            </a:r>
+            <a:r>
+              <a:rPr lang="en-US" sz="2400" dirty="0" smtClean="0"/>
+              <a:t> </a:t>
+            </a:r>
+            <a:r>
+              <a:rPr lang="en-US" sz="2400" dirty="0" err="1" smtClean="0"/>
+              <a:t>lệ</a:t>
+            </a:r>
+            <a:r>
+              <a:rPr lang="en-US" sz="2400" dirty="0" smtClean="0"/>
+              <a:t> </a:t>
+            </a:r>
+            <a:r>
+              <a:rPr lang="en-US" sz="2400" dirty="0" err="1" smtClean="0"/>
+              <a:t>xảy</a:t>
+            </a:r>
+            <a:r>
+              <a:rPr lang="en-US" sz="2400" dirty="0" smtClean="0"/>
+              <a:t> </a:t>
+            </a:r>
+            <a:r>
+              <a:rPr lang="en-US" sz="2400" dirty="0" err="1" smtClean="0"/>
+              <a:t>ra</a:t>
+            </a:r>
+            <a:r>
+              <a:rPr lang="en-US" sz="2400" dirty="0" smtClean="0"/>
+              <a:t>, </a:t>
+            </a:r>
+            <a:r>
+              <a:rPr lang="en-US" sz="2400" dirty="0" err="1" smtClean="0"/>
+              <a:t>tương</a:t>
+            </a:r>
+            <a:r>
+              <a:rPr lang="en-US" sz="2400" dirty="0" smtClean="0"/>
+              <a:t> </a:t>
+            </a:r>
+            <a:r>
+              <a:rPr lang="en-US" sz="2400" dirty="0" err="1" smtClean="0"/>
+              <a:t>tự</a:t>
+            </a:r>
+            <a:r>
+              <a:rPr lang="en-US" sz="2400" dirty="0" smtClean="0"/>
+              <a:t> </a:t>
+            </a:r>
+            <a:r>
+              <a:rPr lang="en-US" sz="2400" dirty="0" err="1" smtClean="0"/>
+              <a:t>như</a:t>
+            </a:r>
+            <a:r>
+              <a:rPr lang="en-US" sz="2400" dirty="0" smtClean="0"/>
+              <a:t> if…else</a:t>
+            </a:r>
+          </a:p>
+        </p:txBody>
+      </p:sp>
+      <p:sp>
+        <p:nvSpPr>
+          <p:cNvPr id="6" name="TextBox 5"/>
+          <p:cNvSpPr txBox="1"/>
+          <p:nvPr/>
+        </p:nvSpPr>
+        <p:spPr>
+          <a:xfrm>
+            <a:off x="6553200" y="4953000"/>
+            <a:ext cx="2290114" cy="369332"/>
+          </a:xfrm>
+          <a:prstGeom prst="rect">
+            <a:avLst/>
+          </a:prstGeom>
+          <a:noFill/>
+        </p:spPr>
+        <p:txBody>
+          <a:bodyPr wrap="none" rtlCol="0">
+            <a:spAutoFit/>
+          </a:bodyPr>
+          <a:lstStyle/>
+          <a:p>
+            <a:r>
+              <a:rPr lang="en-US" dirty="0" err="1"/>
+              <a:t>Kết</a:t>
+            </a:r>
+            <a:r>
+              <a:rPr lang="en-US" dirty="0"/>
+              <a:t> </a:t>
+            </a:r>
+            <a:r>
+              <a:rPr lang="en-US" dirty="0" err="1"/>
+              <a:t>quả</a:t>
+            </a:r>
+            <a:r>
+              <a:rPr lang="en-US" dirty="0"/>
+              <a:t> </a:t>
+            </a:r>
+            <a:r>
+              <a:rPr lang="en-US" dirty="0" err="1"/>
+              <a:t>khi</a:t>
+            </a:r>
+            <a:r>
+              <a:rPr lang="en-US" dirty="0"/>
+              <a:t> </a:t>
+            </a:r>
+            <a:r>
+              <a:rPr lang="en-US" dirty="0" err="1"/>
+              <a:t>có</a:t>
+            </a:r>
+            <a:r>
+              <a:rPr lang="en-US" dirty="0"/>
+              <a:t> </a:t>
+            </a:r>
+            <a:r>
+              <a:rPr lang="en-US" dirty="0" err="1"/>
+              <a:t>ngoại</a:t>
+            </a:r>
+            <a:r>
+              <a:rPr lang="en-US" dirty="0"/>
+              <a:t> </a:t>
+            </a:r>
+            <a:r>
+              <a:rPr lang="en-US" dirty="0" err="1"/>
+              <a:t>lệ</a:t>
+            </a:r>
+            <a:endParaRPr lang="en-US" dirty="0"/>
+          </a:p>
+        </p:txBody>
+      </p:sp>
+      <p:pic>
+        <p:nvPicPr>
+          <p:cNvPr id="4" name="Picture 3" descr="Screen Clipping"/>
+          <p:cNvPicPr>
+            <a:picLocks noChangeAspect="1"/>
+          </p:cNvPicPr>
+          <p:nvPr/>
+        </p:nvPicPr>
+        <p:blipFill>
+          <a:blip r:embed="rId3">
+            <a:extLst>
+              <a:ext uri="{28A0092B-C50C-407E-A947-70E740481C1C}">
+                <a14:useLocalDpi xmlns:a14="http://schemas.microsoft.com/office/drawing/2010/main" val="0"/>
+              </a:ext>
+            </a:extLst>
+          </a:blip>
+          <a:stretch>
+            <a:fillRect/>
+          </a:stretch>
+        </p:blipFill>
+        <p:spPr>
+          <a:xfrm>
+            <a:off x="5181600" y="5715000"/>
+            <a:ext cx="3877216" cy="933580"/>
+          </a:xfrm>
+          <a:prstGeom prst="rect">
+            <a:avLst/>
+          </a:prstGeom>
+        </p:spPr>
+      </p:pic>
+    </p:spTree>
+    <p:extLst>
+      <p:ext uri="{BB962C8B-B14F-4D97-AF65-F5344CB8AC3E}">
+        <p14:creationId xmlns:p14="http://schemas.microsoft.com/office/powerpoint/2010/main" val="1668306685"/>
+      </p:ext>
+    </p:extLst>
+  </p:cSld>
+  <p:clrMapOvr>
+    <a:masterClrMapping/>
+  </p:clrMapOvr>
+</p:sld>
+</file>
+
+<file path=ppt/slides/slide22.xml><?xml version="1.0" encoding="utf-8"?>
+<p:sld xmlns:a="http://schemas.openxmlformats.org/drawingml/2006/main" xmlns:r="http://schemas.openxmlformats.org/officeDocument/2006/relationships" xmlns:p="http://schemas.openxmlformats.org/presentationml/2006/main">
+  <p:cSld>
+    <p:spTree>
+      <p:nvGrpSpPr>
+        <p:cNvPr id="1" name=""/>
+        <p:cNvGrpSpPr/>
+        <p:nvPr/>
+      </p:nvGrpSpPr>
+      <p:grpSpPr>
+        <a:xfrm>
+          <a:off x="0" y="0"/>
+          <a:ext cx="0" cy="0"/>
+          <a:chOff x="0" y="0"/>
+          <a:chExt cx="0" cy="0"/>
+        </a:xfrm>
+      </p:grpSpPr>
       <p:sp>
         <p:nvSpPr>
           <p:cNvPr id="2" name="Title 1"/>
@@ -8985,7 +9416,7 @@
 </p:sld>
 </file>
 
-<file path=ppt/slides/slide21.xml><?xml version="1.0" encoding="utf-8"?>
+<file path=ppt/slides/slide23.xml><?xml version="1.0" encoding="utf-8"?>
 <p:sld xmlns:a="http://schemas.openxmlformats.org/drawingml/2006/main" xmlns:r="http://schemas.openxmlformats.org/officeDocument/2006/relationships" xmlns:p="http://schemas.openxmlformats.org/presentationml/2006/main">
   <p:cSld>
     <p:spTree>
@@ -9413,6 +9844,116 @@
     <p:extLst>
       <p:ext uri="{BB962C8B-B14F-4D97-AF65-F5344CB8AC3E}">
         <p14:creationId xmlns:p14="http://schemas.microsoft.com/office/powerpoint/2010/main" val="467921200"/>
+      </p:ext>
+    </p:extLst>
+  </p:cSld>
+  <p:clrMapOvr>
+    <a:masterClrMapping/>
+  </p:clrMapOvr>
+</p:sld>
+</file>
+
+<file path=ppt/slides/slide24.xml><?xml version="1.0" encoding="utf-8"?>
+<p:sld xmlns:a="http://schemas.openxmlformats.org/drawingml/2006/main" xmlns:r="http://schemas.openxmlformats.org/officeDocument/2006/relationships" xmlns:p="http://schemas.openxmlformats.org/presentationml/2006/main">
+  <p:cSld>
+    <p:spTree>
+      <p:nvGrpSpPr>
+        <p:cNvPr id="1" name=""/>
+        <p:cNvGrpSpPr/>
+        <p:nvPr/>
+      </p:nvGrpSpPr>
+      <p:grpSpPr>
+        <a:xfrm>
+          <a:off x="0" y="0"/>
+          <a:ext cx="0" cy="0"/>
+          <a:chOff x="0" y="0"/>
+          <a:chExt cx="0" cy="0"/>
+        </a:xfrm>
+      </p:grpSpPr>
+      <p:sp>
+        <p:nvSpPr>
+          <p:cNvPr id="2" name="Title 1"/>
+          <p:cNvSpPr>
+            <a:spLocks noGrp="1"/>
+          </p:cNvSpPr>
+          <p:nvPr>
+            <p:ph type="title"/>
+          </p:nvPr>
+        </p:nvSpPr>
+        <p:spPr/>
+        <p:txBody>
+          <a:bodyPr/>
+          <a:lstStyle/>
+          <a:p>
+            <a:r>
+              <a:rPr lang="en-US" dirty="0" err="1" smtClean="0"/>
+              <a:t>Tham</a:t>
+            </a:r>
+            <a:r>
+              <a:rPr lang="en-US" dirty="0" smtClean="0"/>
+              <a:t> </a:t>
+            </a:r>
+            <a:r>
+              <a:rPr lang="en-US" dirty="0" err="1" smtClean="0"/>
+              <a:t>khảo</a:t>
+            </a:r>
+            <a:endParaRPr lang="en-US" dirty="0"/>
+          </a:p>
+        </p:txBody>
+      </p:sp>
+      <p:sp>
+        <p:nvSpPr>
+          <p:cNvPr id="3" name="Content Placeholder 2"/>
+          <p:cNvSpPr>
+            <a:spLocks noGrp="1"/>
+          </p:cNvSpPr>
+          <p:nvPr>
+            <p:ph sz="quarter" idx="1"/>
+          </p:nvPr>
+        </p:nvSpPr>
+        <p:spPr/>
+        <p:txBody>
+          <a:bodyPr/>
+          <a:lstStyle/>
+          <a:p>
+            <a:r>
+              <a:rPr lang="en-US" dirty="0">
+                <a:hlinkClick r:id="rId2"/>
+              </a:rPr>
+              <a:t>http://</a:t>
+            </a:r>
+            <a:r>
+              <a:rPr lang="en-US" dirty="0" smtClean="0">
+                <a:hlinkClick r:id="rId2"/>
+              </a:rPr>
+              <a:t>www.tutorialspoint.com/javaexamples/exception_overloaded_method.htm</a:t>
+            </a:r>
+            <a:endParaRPr lang="en-US" dirty="0" smtClean="0"/>
+          </a:p>
+          <a:p>
+            <a:r>
+              <a:rPr lang="en-US" dirty="0">
+                <a:hlinkClick r:id="rId3"/>
+              </a:rPr>
+              <a:t>https://docs.oracle.com/javase/tutorial/essential/exceptions</a:t>
+            </a:r>
+            <a:r>
+              <a:rPr lang="en-US" dirty="0" smtClean="0">
+                <a:hlinkClick r:id="rId3"/>
+              </a:rPr>
+              <a:t>/</a:t>
+            </a:r>
+            <a:endParaRPr lang="en-US" dirty="0" smtClean="0"/>
+          </a:p>
+          <a:p>
+            <a:endParaRPr lang="en-US" dirty="0"/>
+          </a:p>
+        </p:txBody>
+      </p:sp>
+    </p:spTree>
+    <p:extLst>
+      <p:ext uri="{BB962C8B-B14F-4D97-AF65-F5344CB8AC3E}">
+        <p14:creationId xmlns:p14="http://schemas.microsoft.com/office/powerpoint/2010/main" val="1763643016"/>
       </p:ext>
     </p:extLst>
   </p:cSld>

</xml_diff>